<commit_message>
new dev model introduction
</commit_message>
<xml_diff>
--- a/软件测试理论.pptx
+++ b/软件测试理论.pptx
@@ -5,10 +5,10 @@
     <p:sldMasterId id="2147483648" r:id="rId1"/>
   </p:sldMasterIdLst>
   <p:notesMasterIdLst>
-    <p:notesMasterId r:id="rId15"/>
+    <p:notesMasterId r:id="rId17"/>
   </p:notesMasterIdLst>
   <p:handoutMasterIdLst>
-    <p:handoutMasterId r:id="rId16"/>
+    <p:handoutMasterId r:id="rId18"/>
   </p:handoutMasterIdLst>
   <p:sldIdLst>
     <p:sldId id="256" r:id="rId2"/>
@@ -23,7 +23,9 @@
     <p:sldId id="277" r:id="rId11"/>
     <p:sldId id="278" r:id="rId12"/>
     <p:sldId id="279" r:id="rId13"/>
-    <p:sldId id="262" r:id="rId14"/>
+    <p:sldId id="280" r:id="rId14"/>
+    <p:sldId id="281" r:id="rId15"/>
+    <p:sldId id="262" r:id="rId16"/>
   </p:sldIdLst>
   <p:sldSz cx="12192000" cy="6858000"/>
   <p:notesSz cx="6858000" cy="9144000"/>
@@ -212,7 +214,7 @@
           <a:p>
             <a:fld id="{99895F2A-9912-4EB7-BEC7-C73E1A29F54B}" type="datetimeFigureOut">
               <a:rPr lang="zh-CN" altLang="en-US" smtClean="0"/>
-              <a:t>2020/8/5</a:t>
+              <a:t>2020/8/13</a:t>
             </a:fld>
             <a:endParaRPr lang="zh-CN" altLang="en-US"/>
           </a:p>
@@ -409,7 +411,7 @@
           <a:p>
             <a:fld id="{88B77CF3-BA1E-46AF-AB19-80D316F98285}" type="datetimeFigureOut">
               <a:rPr lang="zh-CN" altLang="en-US" smtClean="0"/>
-              <a:t>2020/8/5</a:t>
+              <a:t>2020/8/13</a:t>
             </a:fld>
             <a:endParaRPr lang="zh-CN" altLang="en-US"/>
           </a:p>
@@ -1259,6 +1261,242 @@
             <a:fld id="{594112D7-EFBF-4E62-90E4-A5FE39C6DB5C}" type="slidenum">
               <a:rPr lang="zh-CN" altLang="en-US" smtClean="0"/>
               <a:t>13</a:t>
+            </a:fld>
+            <a:endParaRPr lang="zh-CN" altLang="en-US"/>
+          </a:p>
+        </p:txBody>
+      </p:sp>
+    </p:spTree>
+    <p:extLst>
+      <p:ext uri="{BB962C8B-B14F-4D97-AF65-F5344CB8AC3E}">
+        <p14:creationId xmlns:p14="http://schemas.microsoft.com/office/powerpoint/2010/main" val="1875319268"/>
+      </p:ext>
+    </p:extLst>
+  </p:cSld>
+  <p:clrMapOvr>
+    <a:masterClrMapping/>
+  </p:clrMapOvr>
+</p:notes>
+</file>
+
+<file path=ppt/notesSlides/notesSlide14.xml><?xml version="1.0" encoding="utf-8"?>
+<p:notes xmlns:a="http://schemas.openxmlformats.org/drawingml/2006/main" xmlns:r="http://schemas.openxmlformats.org/officeDocument/2006/relationships" xmlns:p="http://schemas.openxmlformats.org/presentationml/2006/main">
+  <p:cSld>
+    <p:spTree>
+      <p:nvGrpSpPr>
+        <p:cNvPr id="1" name=""/>
+        <p:cNvGrpSpPr/>
+        <p:nvPr/>
+      </p:nvGrpSpPr>
+      <p:grpSpPr>
+        <a:xfrm>
+          <a:off x="0" y="0"/>
+          <a:ext cx="0" cy="0"/>
+          <a:chOff x="0" y="0"/>
+          <a:chExt cx="0" cy="0"/>
+        </a:xfrm>
+      </p:grpSpPr>
+      <p:sp>
+        <p:nvSpPr>
+          <p:cNvPr id="2" name="Slide Image Placeholder 1"/>
+          <p:cNvSpPr>
+            <a:spLocks noGrp="1" noRot="1" noChangeAspect="1"/>
+          </p:cNvSpPr>
+          <p:nvPr>
+            <p:ph type="sldImg"/>
+          </p:nvPr>
+        </p:nvSpPr>
+        <p:spPr/>
+      </p:sp>
+      <p:sp>
+        <p:nvSpPr>
+          <p:cNvPr id="3" name="Notes Placeholder 2"/>
+          <p:cNvSpPr>
+            <a:spLocks noGrp="1"/>
+          </p:cNvSpPr>
+          <p:nvPr>
+            <p:ph type="body" idx="1"/>
+          </p:nvPr>
+        </p:nvSpPr>
+        <p:spPr/>
+        <p:txBody>
+          <a:bodyPr/>
+          <a:lstStyle/>
+          <a:p>
+            <a:endParaRPr lang="zh-CN" altLang="en-US"/>
+          </a:p>
+        </p:txBody>
+      </p:sp>
+      <p:sp>
+        <p:nvSpPr>
+          <p:cNvPr id="5" name="Footer Placeholder 4"/>
+          <p:cNvSpPr>
+            <a:spLocks noGrp="1"/>
+          </p:cNvSpPr>
+          <p:nvPr>
+            <p:ph type="ftr" sz="quarter" idx="11"/>
+            <p:custDataLst>
+              <p:tags r:id="rId1"/>
+            </p:custDataLst>
+          </p:nvPr>
+        </p:nvSpPr>
+        <p:spPr/>
+        <p:txBody>
+          <a:bodyPr/>
+          <a:lstStyle/>
+          <a:p>
+            <a:r>
+              <a:rPr lang="en-US" altLang="zh-CN"/>
+              <a:t>Presentation classification is </a:t>
+            </a:r>
+            <a:r>
+              <a:rPr lang="en-US" altLang="zh-CN" b="1"/>
+              <a:t>Internal.</a:t>
+            </a:r>
+            <a:r>
+              <a:rPr lang="en-US" altLang="zh-CN"/>
+              <a:t> Do not distribute to third parties without approval.</a:t>
+            </a:r>
+            <a:endParaRPr lang="zh-CN" altLang="en-US"/>
+          </a:p>
+        </p:txBody>
+      </p:sp>
+      <p:sp>
+        <p:nvSpPr>
+          <p:cNvPr id="6" name="Slide Number Placeholder 5"/>
+          <p:cNvSpPr>
+            <a:spLocks noGrp="1"/>
+          </p:cNvSpPr>
+          <p:nvPr>
+            <p:ph type="sldNum" sz="quarter" idx="12"/>
+          </p:nvPr>
+        </p:nvSpPr>
+        <p:spPr/>
+        <p:txBody>
+          <a:bodyPr/>
+          <a:lstStyle/>
+          <a:p>
+            <a:fld id="{594112D7-EFBF-4E62-90E4-A5FE39C6DB5C}" type="slidenum">
+              <a:rPr lang="zh-CN" altLang="en-US" smtClean="0"/>
+              <a:t>14</a:t>
+            </a:fld>
+            <a:endParaRPr lang="zh-CN" altLang="en-US"/>
+          </a:p>
+        </p:txBody>
+      </p:sp>
+    </p:spTree>
+    <p:extLst>
+      <p:ext uri="{BB962C8B-B14F-4D97-AF65-F5344CB8AC3E}">
+        <p14:creationId xmlns:p14="http://schemas.microsoft.com/office/powerpoint/2010/main" val="4071285140"/>
+      </p:ext>
+    </p:extLst>
+  </p:cSld>
+  <p:clrMapOvr>
+    <a:masterClrMapping/>
+  </p:clrMapOvr>
+</p:notes>
+</file>
+
+<file path=ppt/notesSlides/notesSlide15.xml><?xml version="1.0" encoding="utf-8"?>
+<p:notes xmlns:a="http://schemas.openxmlformats.org/drawingml/2006/main" xmlns:r="http://schemas.openxmlformats.org/officeDocument/2006/relationships" xmlns:p="http://schemas.openxmlformats.org/presentationml/2006/main">
+  <p:cSld>
+    <p:spTree>
+      <p:nvGrpSpPr>
+        <p:cNvPr id="1" name=""/>
+        <p:cNvGrpSpPr/>
+        <p:nvPr/>
+      </p:nvGrpSpPr>
+      <p:grpSpPr>
+        <a:xfrm>
+          <a:off x="0" y="0"/>
+          <a:ext cx="0" cy="0"/>
+          <a:chOff x="0" y="0"/>
+          <a:chExt cx="0" cy="0"/>
+        </a:xfrm>
+      </p:grpSpPr>
+      <p:sp>
+        <p:nvSpPr>
+          <p:cNvPr id="2" name="Slide Image Placeholder 1"/>
+          <p:cNvSpPr>
+            <a:spLocks noGrp="1" noRot="1" noChangeAspect="1"/>
+          </p:cNvSpPr>
+          <p:nvPr>
+            <p:ph type="sldImg"/>
+          </p:nvPr>
+        </p:nvSpPr>
+        <p:spPr/>
+      </p:sp>
+      <p:sp>
+        <p:nvSpPr>
+          <p:cNvPr id="3" name="Notes Placeholder 2"/>
+          <p:cNvSpPr>
+            <a:spLocks noGrp="1"/>
+          </p:cNvSpPr>
+          <p:nvPr>
+            <p:ph type="body" idx="1"/>
+          </p:nvPr>
+        </p:nvSpPr>
+        <p:spPr/>
+        <p:txBody>
+          <a:bodyPr/>
+          <a:lstStyle/>
+          <a:p>
+            <a:endParaRPr lang="zh-CN" altLang="en-US"/>
+          </a:p>
+        </p:txBody>
+      </p:sp>
+      <p:sp>
+        <p:nvSpPr>
+          <p:cNvPr id="5" name="Footer Placeholder 4"/>
+          <p:cNvSpPr>
+            <a:spLocks noGrp="1"/>
+          </p:cNvSpPr>
+          <p:nvPr>
+            <p:ph type="ftr" sz="quarter" idx="11"/>
+            <p:custDataLst>
+              <p:tags r:id="rId1"/>
+            </p:custDataLst>
+          </p:nvPr>
+        </p:nvSpPr>
+        <p:spPr/>
+        <p:txBody>
+          <a:bodyPr/>
+          <a:lstStyle/>
+          <a:p>
+            <a:r>
+              <a:rPr lang="en-US" altLang="zh-CN"/>
+              <a:t>Presentation classification is </a:t>
+            </a:r>
+            <a:r>
+              <a:rPr lang="en-US" altLang="zh-CN" b="1"/>
+              <a:t>Internal.</a:t>
+            </a:r>
+            <a:r>
+              <a:rPr lang="en-US" altLang="zh-CN"/>
+              <a:t> Do not distribute to third parties without approval.</a:t>
+            </a:r>
+            <a:endParaRPr lang="zh-CN" altLang="en-US"/>
+          </a:p>
+        </p:txBody>
+      </p:sp>
+      <p:sp>
+        <p:nvSpPr>
+          <p:cNvPr id="6" name="Slide Number Placeholder 5"/>
+          <p:cNvSpPr>
+            <a:spLocks noGrp="1"/>
+          </p:cNvSpPr>
+          <p:nvPr>
+            <p:ph type="sldNum" sz="quarter" idx="12"/>
+          </p:nvPr>
+        </p:nvSpPr>
+        <p:spPr/>
+        <p:txBody>
+          <a:bodyPr/>
+          <a:lstStyle/>
+          <a:p>
+            <a:fld id="{594112D7-EFBF-4E62-90E4-A5FE39C6DB5C}" type="slidenum">
+              <a:rPr lang="zh-CN" altLang="en-US" smtClean="0"/>
+              <a:t>15</a:t>
             </a:fld>
             <a:endParaRPr lang="zh-CN" altLang="en-US"/>
           </a:p>
@@ -5516,6 +5754,282 @@
       </p:grpSpPr>
       <p:sp>
         <p:nvSpPr>
+          <p:cNvPr id="4" name="文本框 3"/>
+          <p:cNvSpPr txBox="1"/>
+          <p:nvPr/>
+        </p:nvSpPr>
+        <p:spPr>
+          <a:xfrm>
+            <a:off x="430530" y="127635"/>
+            <a:ext cx="7019842" cy="523220"/>
+          </a:xfrm>
+          <a:prstGeom prst="rect">
+            <a:avLst/>
+          </a:prstGeom>
+          <a:noFill/>
+        </p:spPr>
+        <p:txBody>
+          <a:bodyPr wrap="square" rtlCol="0">
+            <a:spAutoFit/>
+          </a:bodyPr>
+          <a:lstStyle/>
+          <a:p>
+            <a:r>
+              <a:rPr lang="en-US" altLang="zh-CN" sz="2800" dirty="0">
+                <a:latin typeface="+mn-ea"/>
+                <a:sym typeface="+mn-ea"/>
+              </a:rPr>
+              <a:t>1.7.3. </a:t>
+            </a:r>
+            <a:r>
+              <a:rPr lang="zh-CN" altLang="en-US" sz="2800" dirty="0">
+                <a:latin typeface="+mn-ea"/>
+                <a:sym typeface="+mn-ea"/>
+              </a:rPr>
+              <a:t>增量模型</a:t>
+            </a:r>
+            <a:endParaRPr lang="zh-CN" altLang="en-US" sz="2800" dirty="0">
+              <a:latin typeface="+mn-ea"/>
+            </a:endParaRPr>
+          </a:p>
+        </p:txBody>
+      </p:sp>
+      <p:cxnSp>
+        <p:nvCxnSpPr>
+          <p:cNvPr id="5" name="直接连接符 4"/>
+          <p:cNvCxnSpPr/>
+          <p:nvPr/>
+        </p:nvCxnSpPr>
+        <p:spPr>
+          <a:xfrm>
+            <a:off x="430530" y="711200"/>
+            <a:ext cx="10398760" cy="0"/>
+          </a:xfrm>
+          <a:prstGeom prst="line">
+            <a:avLst/>
+          </a:prstGeom>
+          <a:ln w="12700" cmpd="sng">
+            <a:solidFill>
+              <a:srgbClr val="C00000"/>
+            </a:solidFill>
+            <a:prstDash val="solid"/>
+          </a:ln>
+        </p:spPr>
+        <p:style>
+          <a:lnRef idx="1">
+            <a:schemeClr val="accent1"/>
+          </a:lnRef>
+          <a:fillRef idx="0">
+            <a:schemeClr val="accent1"/>
+          </a:fillRef>
+          <a:effectRef idx="0">
+            <a:schemeClr val="accent1"/>
+          </a:effectRef>
+          <a:fontRef idx="minor">
+            <a:schemeClr val="tx1"/>
+          </a:fontRef>
+        </p:style>
+      </p:cxnSp>
+      <p:pic>
+        <p:nvPicPr>
+          <p:cNvPr id="6" name="图片 5" descr="图片包含 游戏机, 照片, 大&#10;&#10;描述已自动生成">
+            <a:extLst>
+              <a:ext uri="{FF2B5EF4-FFF2-40B4-BE49-F238E27FC236}">
+                <a16:creationId xmlns:a16="http://schemas.microsoft.com/office/drawing/2014/main" id="{CDB77FCD-E224-4F4B-A922-D490A0359E65}"/>
+              </a:ext>
+            </a:extLst>
+          </p:cNvPr>
+          <p:cNvPicPr>
+            <a:picLocks noChangeAspect="1"/>
+          </p:cNvPicPr>
+          <p:nvPr/>
+        </p:nvPicPr>
+        <p:blipFill>
+          <a:blip r:embed="rId3"/>
+          <a:stretch>
+            <a:fillRect/>
+          </a:stretch>
+        </p:blipFill>
+        <p:spPr>
+          <a:xfrm>
+            <a:off x="1601153" y="1489433"/>
+            <a:ext cx="8057514" cy="3879133"/>
+          </a:xfrm>
+          <a:prstGeom prst="rect">
+            <a:avLst/>
+          </a:prstGeom>
+        </p:spPr>
+      </p:pic>
+    </p:spTree>
+    <p:extLst>
+      <p:ext uri="{BB962C8B-B14F-4D97-AF65-F5344CB8AC3E}">
+        <p14:creationId xmlns:p14="http://schemas.microsoft.com/office/powerpoint/2010/main" val="893324004"/>
+      </p:ext>
+    </p:extLst>
+  </p:cSld>
+  <p:clrMapOvr>
+    <a:masterClrMapping/>
+  </p:clrMapOvr>
+</p:sld>
+</file>
+
+<file path=ppt/slides/slide14.xml><?xml version="1.0" encoding="utf-8"?>
+<p:sld xmlns:a="http://schemas.openxmlformats.org/drawingml/2006/main" xmlns:r="http://schemas.openxmlformats.org/officeDocument/2006/relationships" xmlns:p="http://schemas.openxmlformats.org/presentationml/2006/main">
+  <p:cSld>
+    <p:spTree>
+      <p:nvGrpSpPr>
+        <p:cNvPr id="1" name=""/>
+        <p:cNvGrpSpPr/>
+        <p:nvPr/>
+      </p:nvGrpSpPr>
+      <p:grpSpPr>
+        <a:xfrm>
+          <a:off x="0" y="0"/>
+          <a:ext cx="0" cy="0"/>
+          <a:chOff x="0" y="0"/>
+          <a:chExt cx="0" cy="0"/>
+        </a:xfrm>
+      </p:grpSpPr>
+      <p:sp>
+        <p:nvSpPr>
+          <p:cNvPr id="4" name="文本框 3"/>
+          <p:cNvSpPr txBox="1"/>
+          <p:nvPr/>
+        </p:nvSpPr>
+        <p:spPr>
+          <a:xfrm>
+            <a:off x="430530" y="127635"/>
+            <a:ext cx="7019842" cy="523220"/>
+          </a:xfrm>
+          <a:prstGeom prst="rect">
+            <a:avLst/>
+          </a:prstGeom>
+          <a:noFill/>
+        </p:spPr>
+        <p:txBody>
+          <a:bodyPr wrap="square" rtlCol="0">
+            <a:spAutoFit/>
+          </a:bodyPr>
+          <a:lstStyle/>
+          <a:p>
+            <a:r>
+              <a:rPr lang="en-US" altLang="zh-CN" sz="2800" dirty="0">
+                <a:latin typeface="+mn-ea"/>
+                <a:sym typeface="+mn-ea"/>
+              </a:rPr>
+              <a:t>1.7.4. </a:t>
+            </a:r>
+            <a:r>
+              <a:rPr lang="zh-CN" altLang="en-US" sz="2800" dirty="0">
+                <a:latin typeface="+mn-ea"/>
+                <a:sym typeface="+mn-ea"/>
+              </a:rPr>
+              <a:t>螺旋模型</a:t>
+            </a:r>
+            <a:endParaRPr lang="zh-CN" altLang="en-US" sz="2800" dirty="0">
+              <a:latin typeface="+mn-ea"/>
+            </a:endParaRPr>
+          </a:p>
+        </p:txBody>
+      </p:sp>
+      <p:cxnSp>
+        <p:nvCxnSpPr>
+          <p:cNvPr id="5" name="直接连接符 4"/>
+          <p:cNvCxnSpPr/>
+          <p:nvPr/>
+        </p:nvCxnSpPr>
+        <p:spPr>
+          <a:xfrm>
+            <a:off x="430530" y="711200"/>
+            <a:ext cx="10398760" cy="0"/>
+          </a:xfrm>
+          <a:prstGeom prst="line">
+            <a:avLst/>
+          </a:prstGeom>
+          <a:ln w="12700" cmpd="sng">
+            <a:solidFill>
+              <a:srgbClr val="C00000"/>
+            </a:solidFill>
+            <a:prstDash val="solid"/>
+          </a:ln>
+        </p:spPr>
+        <p:style>
+          <a:lnRef idx="1">
+            <a:schemeClr val="accent1"/>
+          </a:lnRef>
+          <a:fillRef idx="0">
+            <a:schemeClr val="accent1"/>
+          </a:fillRef>
+          <a:effectRef idx="0">
+            <a:schemeClr val="accent1"/>
+          </a:effectRef>
+          <a:fontRef idx="minor">
+            <a:schemeClr val="tx1"/>
+          </a:fontRef>
+        </p:style>
+      </p:cxnSp>
+      <p:pic>
+        <p:nvPicPr>
+          <p:cNvPr id="6" name="图片 5" descr="地图上有字&#10;&#10;描述已自动生成">
+            <a:extLst>
+              <a:ext uri="{FF2B5EF4-FFF2-40B4-BE49-F238E27FC236}">
+                <a16:creationId xmlns:a16="http://schemas.microsoft.com/office/drawing/2014/main" id="{641B2C2C-7378-41F4-854E-C44A1ECF33E6}"/>
+              </a:ext>
+            </a:extLst>
+          </p:cNvPr>
+          <p:cNvPicPr>
+            <a:picLocks noChangeAspect="1"/>
+          </p:cNvPicPr>
+          <p:nvPr/>
+        </p:nvPicPr>
+        <p:blipFill>
+          <a:blip r:embed="rId3"/>
+          <a:stretch>
+            <a:fillRect/>
+          </a:stretch>
+        </p:blipFill>
+        <p:spPr>
+          <a:xfrm>
+            <a:off x="2384758" y="771546"/>
+            <a:ext cx="6958025" cy="6077918"/>
+          </a:xfrm>
+          <a:prstGeom prst="rect">
+            <a:avLst/>
+          </a:prstGeom>
+        </p:spPr>
+      </p:pic>
+    </p:spTree>
+    <p:extLst>
+      <p:ext uri="{BB962C8B-B14F-4D97-AF65-F5344CB8AC3E}">
+        <p14:creationId xmlns:p14="http://schemas.microsoft.com/office/powerpoint/2010/main" val="1324834665"/>
+      </p:ext>
+    </p:extLst>
+  </p:cSld>
+  <p:clrMapOvr>
+    <a:masterClrMapping/>
+  </p:clrMapOvr>
+</p:sld>
+</file>
+
+<file path=ppt/slides/slide15.xml><?xml version="1.0" encoding="utf-8"?>
+<p:sld xmlns:a="http://schemas.openxmlformats.org/drawingml/2006/main" xmlns:r="http://schemas.openxmlformats.org/officeDocument/2006/relationships" xmlns:p="http://schemas.openxmlformats.org/presentationml/2006/main">
+  <p:cSld>
+    <p:spTree>
+      <p:nvGrpSpPr>
+        <p:cNvPr id="1" name=""/>
+        <p:cNvGrpSpPr/>
+        <p:nvPr/>
+      </p:nvGrpSpPr>
+      <p:grpSpPr>
+        <a:xfrm>
+          <a:off x="0" y="0"/>
+          <a:ext cx="0" cy="0"/>
+          <a:chOff x="0" y="0"/>
+          <a:chExt cx="0" cy="0"/>
+        </a:xfrm>
+      </p:grpSpPr>
+      <p:sp>
+        <p:nvSpPr>
           <p:cNvPr id="2" name="文本框 1"/>
           <p:cNvSpPr txBox="1"/>
           <p:nvPr/>
@@ -7728,6 +8242,22 @@
 </file>
 
 <file path=ppt/tags/tag15.xml><?xml version="1.0" encoding="utf-8"?>
+<p:tagLst xmlns:a="http://schemas.openxmlformats.org/drawingml/2006/main" xmlns:r="http://schemas.openxmlformats.org/officeDocument/2006/relationships" xmlns:p="http://schemas.openxmlformats.org/presentationml/2006/main">
+  <p:tag name="BJHEADERFOOTERLABEL" val="TRUE"/>
+  <p:tag name="BJHEADERFOOTERTEXTLABEL" val="Presentation classification is Internal. Do not distribute to third parties without approval."/>
+  <p:tag name="BJHEADERFOOTERTEXTMARKING" val="Presentation classification is Internal. Do not distribute to third parties without approval."/>
+</p:tagLst>
+</file>
+
+<file path=ppt/tags/tag16.xml><?xml version="1.0" encoding="utf-8"?>
+<p:tagLst xmlns:a="http://schemas.openxmlformats.org/drawingml/2006/main" xmlns:r="http://schemas.openxmlformats.org/officeDocument/2006/relationships" xmlns:p="http://schemas.openxmlformats.org/presentationml/2006/main">
+  <p:tag name="BJHEADERFOOTERLABEL" val="TRUE"/>
+  <p:tag name="BJHEADERFOOTERTEXTLABEL" val="Presentation classification is Internal. Do not distribute to third parties without approval."/>
+  <p:tag name="BJHEADERFOOTERTEXTMARKING" val="Presentation classification is Internal. Do not distribute to third parties without approval."/>
+</p:tagLst>
+</file>
+
+<file path=ppt/tags/tag17.xml><?xml version="1.0" encoding="utf-8"?>
 <p:tagLst xmlns:a="http://schemas.openxmlformats.org/drawingml/2006/main" xmlns:r="http://schemas.openxmlformats.org/officeDocument/2006/relationships" xmlns:p="http://schemas.openxmlformats.org/presentationml/2006/main">
   <p:tag name="BJHEADERFOOTERLABEL" val="TRUE"/>
   <p:tag name="BJHEADERFOOTERTEXTLABEL" val="Presentation classification is Internal. Do not distribute to third parties without approval."/>

</xml_diff>